<commit_message>
SWOT strategy, use case
</commit_message>
<xml_diff>
--- a/doc/swinz-dokumentace.pptx
+++ b/doc/swinz-dokumentace.pptx
@@ -8,11 +8,13 @@
     <p:sldId id="256" r:id="rId2"/>
     <p:sldId id="257" r:id="rId3"/>
     <p:sldId id="258" r:id="rId4"/>
-    <p:sldId id="259" r:id="rId5"/>
-    <p:sldId id="260" r:id="rId6"/>
-    <p:sldId id="261" r:id="rId7"/>
-    <p:sldId id="262" r:id="rId8"/>
-    <p:sldId id="263" r:id="rId9"/>
+    <p:sldId id="265" r:id="rId5"/>
+    <p:sldId id="259" r:id="rId6"/>
+    <p:sldId id="260" r:id="rId7"/>
+    <p:sldId id="261" r:id="rId8"/>
+    <p:sldId id="262" r:id="rId9"/>
+    <p:sldId id="264" r:id="rId10"/>
+    <p:sldId id="263" r:id="rId11"/>
   </p:sldIdLst>
   <p:sldSz cx="12192000" cy="6858000"/>
   <p:notesSz cx="6858000" cy="9144000"/>
@@ -266,7 +268,7 @@
           <a:p>
             <a:fld id="{433687C1-ED5C-48CF-A0AE-205A7F0B2F87}" type="datetimeFigureOut">
               <a:rPr lang="cs-CZ" smtClean="0"/>
-              <a:t>16.06.2020</a:t>
+              <a:t>19.06.2020</a:t>
             </a:fld>
             <a:endParaRPr lang="cs-CZ"/>
           </a:p>
@@ -464,7 +466,7 @@
           <a:p>
             <a:fld id="{433687C1-ED5C-48CF-A0AE-205A7F0B2F87}" type="datetimeFigureOut">
               <a:rPr lang="cs-CZ" smtClean="0"/>
-              <a:t>16.06.2020</a:t>
+              <a:t>19.06.2020</a:t>
             </a:fld>
             <a:endParaRPr lang="cs-CZ"/>
           </a:p>
@@ -672,7 +674,7 @@
           <a:p>
             <a:fld id="{433687C1-ED5C-48CF-A0AE-205A7F0B2F87}" type="datetimeFigureOut">
               <a:rPr lang="cs-CZ" smtClean="0"/>
-              <a:t>16.06.2020</a:t>
+              <a:t>19.06.2020</a:t>
             </a:fld>
             <a:endParaRPr lang="cs-CZ"/>
           </a:p>
@@ -870,7 +872,7 @@
           <a:p>
             <a:fld id="{433687C1-ED5C-48CF-A0AE-205A7F0B2F87}" type="datetimeFigureOut">
               <a:rPr lang="cs-CZ" smtClean="0"/>
-              <a:t>16.06.2020</a:t>
+              <a:t>19.06.2020</a:t>
             </a:fld>
             <a:endParaRPr lang="cs-CZ"/>
           </a:p>
@@ -1145,7 +1147,7 @@
           <a:p>
             <a:fld id="{433687C1-ED5C-48CF-A0AE-205A7F0B2F87}" type="datetimeFigureOut">
               <a:rPr lang="cs-CZ" smtClean="0"/>
-              <a:t>16.06.2020</a:t>
+              <a:t>19.06.2020</a:t>
             </a:fld>
             <a:endParaRPr lang="cs-CZ"/>
           </a:p>
@@ -1410,7 +1412,7 @@
           <a:p>
             <a:fld id="{433687C1-ED5C-48CF-A0AE-205A7F0B2F87}" type="datetimeFigureOut">
               <a:rPr lang="cs-CZ" smtClean="0"/>
-              <a:t>16.06.2020</a:t>
+              <a:t>19.06.2020</a:t>
             </a:fld>
             <a:endParaRPr lang="cs-CZ"/>
           </a:p>
@@ -1822,7 +1824,7 @@
           <a:p>
             <a:fld id="{433687C1-ED5C-48CF-A0AE-205A7F0B2F87}" type="datetimeFigureOut">
               <a:rPr lang="cs-CZ" smtClean="0"/>
-              <a:t>16.06.2020</a:t>
+              <a:t>19.06.2020</a:t>
             </a:fld>
             <a:endParaRPr lang="cs-CZ"/>
           </a:p>
@@ -1963,7 +1965,7 @@
           <a:p>
             <a:fld id="{433687C1-ED5C-48CF-A0AE-205A7F0B2F87}" type="datetimeFigureOut">
               <a:rPr lang="cs-CZ" smtClean="0"/>
-              <a:t>16.06.2020</a:t>
+              <a:t>19.06.2020</a:t>
             </a:fld>
             <a:endParaRPr lang="cs-CZ"/>
           </a:p>
@@ -2076,7 +2078,7 @@
           <a:p>
             <a:fld id="{433687C1-ED5C-48CF-A0AE-205A7F0B2F87}" type="datetimeFigureOut">
               <a:rPr lang="cs-CZ" smtClean="0"/>
-              <a:t>16.06.2020</a:t>
+              <a:t>19.06.2020</a:t>
             </a:fld>
             <a:endParaRPr lang="cs-CZ"/>
           </a:p>
@@ -2387,7 +2389,7 @@
           <a:p>
             <a:fld id="{433687C1-ED5C-48CF-A0AE-205A7F0B2F87}" type="datetimeFigureOut">
               <a:rPr lang="cs-CZ" smtClean="0"/>
-              <a:t>16.06.2020</a:t>
+              <a:t>19.06.2020</a:t>
             </a:fld>
             <a:endParaRPr lang="cs-CZ"/>
           </a:p>
@@ -2675,7 +2677,7 @@
           <a:p>
             <a:fld id="{433687C1-ED5C-48CF-A0AE-205A7F0B2F87}" type="datetimeFigureOut">
               <a:rPr lang="cs-CZ" smtClean="0"/>
-              <a:t>16.06.2020</a:t>
+              <a:t>19.06.2020</a:t>
             </a:fld>
             <a:endParaRPr lang="cs-CZ"/>
           </a:p>
@@ -2916,7 +2918,7 @@
           <a:p>
             <a:fld id="{433687C1-ED5C-48CF-A0AE-205A7F0B2F87}" type="datetimeFigureOut">
               <a:rPr lang="cs-CZ" smtClean="0"/>
-              <a:t>16.06.2020</a:t>
+              <a:t>19.06.2020</a:t>
             </a:fld>
             <a:endParaRPr lang="cs-CZ"/>
           </a:p>
@@ -3402,6 +3404,97 @@
 </p:sld>
 </file>
 
+<file path=ppt/slides/slide10.xml><?xml version="1.0" encoding="utf-8"?>
+<p:sld xmlns:a="http://schemas.openxmlformats.org/drawingml/2006/main" xmlns:r="http://schemas.openxmlformats.org/officeDocument/2006/relationships" xmlns:p="http://schemas.openxmlformats.org/presentationml/2006/main">
+  <p:cSld>
+    <p:spTree>
+      <p:nvGrpSpPr>
+        <p:cNvPr id="1" name=""/>
+        <p:cNvGrpSpPr/>
+        <p:nvPr/>
+      </p:nvGrpSpPr>
+      <p:grpSpPr>
+        <a:xfrm>
+          <a:off x="0" y="0"/>
+          <a:ext cx="0" cy="0"/>
+          <a:chOff x="0" y="0"/>
+          <a:chExt cx="0" cy="0"/>
+        </a:xfrm>
+      </p:grpSpPr>
+      <p:sp>
+        <p:nvSpPr>
+          <p:cNvPr id="2" name="Nadpis 1">
+            <a:extLst>
+              <a:ext uri="{FF2B5EF4-FFF2-40B4-BE49-F238E27FC236}">
+                <a16:creationId xmlns:a16="http://schemas.microsoft.com/office/drawing/2014/main" id="{55882398-8B22-4A17-9AA8-B27307A85F78}"/>
+              </a:ext>
+            </a:extLst>
+          </p:cNvPr>
+          <p:cNvSpPr>
+            <a:spLocks noGrp="1"/>
+          </p:cNvSpPr>
+          <p:nvPr>
+            <p:ph type="title"/>
+          </p:nvPr>
+        </p:nvSpPr>
+        <p:spPr/>
+        <p:txBody>
+          <a:bodyPr/>
+          <a:lstStyle/>
+          <a:p>
+            <a:pPr algn="ctr"/>
+            <a:endParaRPr lang="cs-CZ" dirty="0"/>
+          </a:p>
+        </p:txBody>
+      </p:sp>
+      <p:pic>
+        <p:nvPicPr>
+          <p:cNvPr id="5" name="Zástupný obsah 4" descr="Obsah obrázku text&#10;&#10;Popis byl vytvořen automaticky">
+            <a:extLst>
+              <a:ext uri="{FF2B5EF4-FFF2-40B4-BE49-F238E27FC236}">
+                <a16:creationId xmlns:a16="http://schemas.microsoft.com/office/drawing/2014/main" id="{0834F0A7-A18A-4DA2-BAB9-7A2069A5912A}"/>
+              </a:ext>
+            </a:extLst>
+          </p:cNvPr>
+          <p:cNvPicPr>
+            <a:picLocks noGrp="1" noChangeAspect="1"/>
+          </p:cNvPicPr>
+          <p:nvPr>
+            <p:ph idx="1"/>
+          </p:nvPr>
+        </p:nvPicPr>
+        <p:blipFill>
+          <a:blip r:embed="rId2">
+            <a:extLst>
+              <a:ext uri="{28A0092B-C50C-407E-A947-70E740481C1C}">
+                <a14:useLocalDpi xmlns:a14="http://schemas.microsoft.com/office/drawing/2010/main" val="0"/>
+              </a:ext>
+            </a:extLst>
+          </a:blip>
+          <a:stretch>
+            <a:fillRect/>
+          </a:stretch>
+        </p:blipFill>
+        <p:spPr>
+          <a:xfrm>
+            <a:off x="131975" y="1351102"/>
+            <a:ext cx="11858920" cy="5398490"/>
+          </a:xfrm>
+        </p:spPr>
+      </p:pic>
+    </p:spTree>
+    <p:extLst>
+      <p:ext uri="{BB962C8B-B14F-4D97-AF65-F5344CB8AC3E}">
+        <p14:creationId xmlns:p14="http://schemas.microsoft.com/office/powerpoint/2010/main" val="4208394178"/>
+      </p:ext>
+    </p:extLst>
+  </p:cSld>
+  <p:clrMapOvr>
+    <a:masterClrMapping/>
+  </p:clrMapOvr>
+</p:sld>
+</file>
+
 <file path=ppt/slides/slide2.xml><?xml version="1.0" encoding="utf-8"?>
 <p:sld xmlns:a="http://schemas.openxmlformats.org/drawingml/2006/main" xmlns:r="http://schemas.openxmlformats.org/officeDocument/2006/relationships" xmlns:p="http://schemas.openxmlformats.org/presentationml/2006/main">
   <p:cSld>
@@ -3614,21 +3707,44 @@
           </a:p>
         </p:txBody>
       </p:sp>
+      <p:sp>
+        <p:nvSpPr>
+          <p:cNvPr id="6" name="Zástupný obsah 5">
+            <a:extLst>
+              <a:ext uri="{FF2B5EF4-FFF2-40B4-BE49-F238E27FC236}">
+                <a16:creationId xmlns:a16="http://schemas.microsoft.com/office/drawing/2014/main" id="{59B45C44-D5A5-427E-995C-97D2EA16095F}"/>
+              </a:ext>
+            </a:extLst>
+          </p:cNvPr>
+          <p:cNvSpPr>
+            <a:spLocks noGrp="1"/>
+          </p:cNvSpPr>
+          <p:nvPr>
+            <p:ph idx="1"/>
+          </p:nvPr>
+        </p:nvSpPr>
+        <p:spPr/>
+        <p:txBody>
+          <a:bodyPr/>
+          <a:lstStyle/>
+          <a:p>
+            <a:endParaRPr lang="cs-CZ" dirty="0"/>
+          </a:p>
+        </p:txBody>
+      </p:sp>
       <p:pic>
         <p:nvPicPr>
-          <p:cNvPr id="4" name="Zástupný obsah 3">
-            <a:extLst>
-              <a:ext uri="{FF2B5EF4-FFF2-40B4-BE49-F238E27FC236}">
-                <a16:creationId xmlns:a16="http://schemas.microsoft.com/office/drawing/2014/main" id="{77870F64-09FD-4D95-97C6-74D64A88BD40}"/>
+          <p:cNvPr id="7" name="Obrázek 6">
+            <a:extLst>
+              <a:ext uri="{FF2B5EF4-FFF2-40B4-BE49-F238E27FC236}">
+                <a16:creationId xmlns:a16="http://schemas.microsoft.com/office/drawing/2014/main" id="{6984321C-DBF4-4BF0-A73D-C2938CCB9452}"/>
               </a:ext>
             </a:extLst>
           </p:cNvPr>
           <p:cNvPicPr>
-            <a:picLocks noGrp="1" noChangeAspect="1"/>
+            <a:picLocks noChangeAspect="1"/>
           </p:cNvPicPr>
-          <p:nvPr>
-            <p:ph idx="1"/>
-          </p:nvPr>
+          <p:nvPr/>
         </p:nvPicPr>
         <p:blipFill>
           <a:blip r:embed="rId2"/>
@@ -3638,38 +3754,8 @@
         </p:blipFill>
         <p:spPr>
           <a:xfrm>
-            <a:off x="838200" y="1690688"/>
-            <a:ext cx="6183044" cy="4351338"/>
-          </a:xfrm>
-          <a:prstGeom prst="rect">
-            <a:avLst/>
-          </a:prstGeom>
-        </p:spPr>
-      </p:pic>
-      <p:pic>
-        <p:nvPicPr>
-          <p:cNvPr id="5" name="Obrázek 4">
-            <a:extLst>
-              <a:ext uri="{FF2B5EF4-FFF2-40B4-BE49-F238E27FC236}">
-                <a16:creationId xmlns:a16="http://schemas.microsoft.com/office/drawing/2014/main" id="{5DE89DC0-E963-48D3-BBD0-7814E3D18BED}"/>
-              </a:ext>
-            </a:extLst>
-          </p:cNvPr>
-          <p:cNvPicPr>
-            <a:picLocks noChangeAspect="1"/>
-          </p:cNvPicPr>
-          <p:nvPr/>
-        </p:nvPicPr>
-        <p:blipFill>
-          <a:blip r:embed="rId3"/>
-          <a:stretch>
-            <a:fillRect/>
-          </a:stretch>
-        </p:blipFill>
-        <p:spPr>
-          <a:xfrm>
-            <a:off x="7021244" y="2028292"/>
-            <a:ext cx="3181350" cy="3152775"/>
+            <a:off x="2344126" y="1690688"/>
+            <a:ext cx="7503748" cy="5105335"/>
           </a:xfrm>
           <a:prstGeom prst="rect">
             <a:avLst/>
@@ -3711,7 +3797,7 @@
           <p:cNvPr id="2" name="Nadpis 1">
             <a:extLst>
               <a:ext uri="{FF2B5EF4-FFF2-40B4-BE49-F238E27FC236}">
-                <a16:creationId xmlns:a16="http://schemas.microsoft.com/office/drawing/2014/main" id="{85CF197E-7584-433D-9E7C-78E2C82F7AE3}"/>
+                <a16:creationId xmlns:a16="http://schemas.microsoft.com/office/drawing/2014/main" id="{F7E7C578-0DDB-43E2-B33E-B51371D4DC33}"/>
               </a:ext>
             </a:extLst>
           </p:cNvPr>
@@ -3730,17 +3816,17 @@
             <a:pPr algn="ctr"/>
             <a:r>
               <a:rPr lang="cs-CZ" dirty="0"/>
-              <a:t>EPC diagram – ovládání teploty</a:t>
+              <a:t>Strategie</a:t>
             </a:r>
           </a:p>
         </p:txBody>
       </p:sp>
       <p:pic>
         <p:nvPicPr>
-          <p:cNvPr id="13" name="Zástupný obsah 12" descr="Obsah obrázku mapa, text&#10;&#10;Popis byl vytvořen automaticky">
-            <a:extLst>
-              <a:ext uri="{FF2B5EF4-FFF2-40B4-BE49-F238E27FC236}">
-                <a16:creationId xmlns:a16="http://schemas.microsoft.com/office/drawing/2014/main" id="{CDF0D140-E31F-44EC-9521-9FD18FF1155F}"/>
+          <p:cNvPr id="4" name="Zástupný obsah 3">
+            <a:extLst>
+              <a:ext uri="{FF2B5EF4-FFF2-40B4-BE49-F238E27FC236}">
+                <a16:creationId xmlns:a16="http://schemas.microsoft.com/office/drawing/2014/main" id="{BD6E17FC-ACF6-4B83-BAE2-0E864A33AE40}"/>
               </a:ext>
             </a:extLst>
           </p:cNvPr>
@@ -3752,28 +3838,25 @@
           </p:nvPr>
         </p:nvPicPr>
         <p:blipFill>
-          <a:blip r:embed="rId2">
-            <a:extLst>
-              <a:ext uri="{28A0092B-C50C-407E-A947-70E740481C1C}">
-                <a14:useLocalDpi xmlns:a14="http://schemas.microsoft.com/office/drawing/2010/main" val="0"/>
-              </a:ext>
-            </a:extLst>
-          </a:blip>
+          <a:blip r:embed="rId2"/>
           <a:stretch>
             <a:fillRect/>
           </a:stretch>
         </p:blipFill>
         <p:spPr>
           <a:xfrm>
-            <a:off x="838200" y="3075502"/>
-            <a:ext cx="10515600" cy="1851584"/>
+            <a:off x="1372743" y="1690688"/>
+            <a:ext cx="9446514" cy="4667250"/>
           </a:xfrm>
+          <a:prstGeom prst="rect">
+            <a:avLst/>
+          </a:prstGeom>
         </p:spPr>
       </p:pic>
     </p:spTree>
     <p:extLst>
       <p:ext uri="{BB962C8B-B14F-4D97-AF65-F5344CB8AC3E}">
-        <p14:creationId xmlns:p14="http://schemas.microsoft.com/office/powerpoint/2010/main" val="4254269900"/>
+        <p14:creationId xmlns:p14="http://schemas.microsoft.com/office/powerpoint/2010/main" val="3026200035"/>
       </p:ext>
     </p:extLst>
   </p:cSld>
@@ -3805,7 +3888,7 @@
           <p:cNvPr id="2" name="Nadpis 1">
             <a:extLst>
               <a:ext uri="{FF2B5EF4-FFF2-40B4-BE49-F238E27FC236}">
-                <a16:creationId xmlns:a16="http://schemas.microsoft.com/office/drawing/2014/main" id="{DC597700-EBED-4BAB-8AC9-67DCBDB216C8}"/>
+                <a16:creationId xmlns:a16="http://schemas.microsoft.com/office/drawing/2014/main" id="{85CF197E-7584-433D-9E7C-78E2C82F7AE3}"/>
               </a:ext>
             </a:extLst>
           </p:cNvPr>
@@ -3824,17 +3907,17 @@
             <a:pPr algn="ctr"/>
             <a:r>
               <a:rPr lang="cs-CZ" dirty="0"/>
-              <a:t>Use case a scénáře</a:t>
+              <a:t>EPC diagram – ovládání teploty</a:t>
             </a:r>
           </a:p>
         </p:txBody>
       </p:sp>
       <p:pic>
         <p:nvPicPr>
-          <p:cNvPr id="9" name="Zástupný obsah 8" descr="Obsah obrázku snímek obrazovky&#10;&#10;Popis byl vytvořen automaticky">
-            <a:extLst>
-              <a:ext uri="{FF2B5EF4-FFF2-40B4-BE49-F238E27FC236}">
-                <a16:creationId xmlns:a16="http://schemas.microsoft.com/office/drawing/2014/main" id="{EE65D677-A344-4654-ABDE-CADF3C8B720D}"/>
+          <p:cNvPr id="13" name="Zástupný obsah 12" descr="Obsah obrázku mapa, text&#10;&#10;Popis byl vytvořen automaticky">
+            <a:extLst>
+              <a:ext uri="{FF2B5EF4-FFF2-40B4-BE49-F238E27FC236}">
+                <a16:creationId xmlns:a16="http://schemas.microsoft.com/office/drawing/2014/main" id="{CDF0D140-E31F-44EC-9521-9FD18FF1155F}"/>
               </a:ext>
             </a:extLst>
           </p:cNvPr>
@@ -3859,15 +3942,15 @@
         </p:blipFill>
         <p:spPr>
           <a:xfrm>
-            <a:off x="1243501" y="1690688"/>
-            <a:ext cx="9704998" cy="4744857"/>
+            <a:off x="838200" y="3075502"/>
+            <a:ext cx="10515600" cy="1851584"/>
           </a:xfrm>
         </p:spPr>
       </p:pic>
     </p:spTree>
     <p:extLst>
       <p:ext uri="{BB962C8B-B14F-4D97-AF65-F5344CB8AC3E}">
-        <p14:creationId xmlns:p14="http://schemas.microsoft.com/office/powerpoint/2010/main" val="2038734746"/>
+        <p14:creationId xmlns:p14="http://schemas.microsoft.com/office/powerpoint/2010/main" val="4254269900"/>
       </p:ext>
     </p:extLst>
   </p:cSld>
@@ -3899,7 +3982,7 @@
           <p:cNvPr id="2" name="Nadpis 1">
             <a:extLst>
               <a:ext uri="{FF2B5EF4-FFF2-40B4-BE49-F238E27FC236}">
-                <a16:creationId xmlns:a16="http://schemas.microsoft.com/office/drawing/2014/main" id="{08668BC7-17A4-4560-A3C4-103A87E14B29}"/>
+                <a16:creationId xmlns:a16="http://schemas.microsoft.com/office/drawing/2014/main" id="{DC597700-EBED-4BAB-8AC9-67DCBDB216C8}"/>
               </a:ext>
             </a:extLst>
           </p:cNvPr>
@@ -3918,24 +4001,17 @@
             <a:pPr algn="ctr"/>
             <a:r>
               <a:rPr lang="cs-CZ" dirty="0"/>
-              <a:t>Sekvenční analytický diagram</a:t>
-            </a:r>
-            <a:br>
-              <a:rPr lang="cs-CZ" dirty="0"/>
-            </a:br>
-            <a:r>
-              <a:rPr lang="cs-CZ" dirty="0"/>
-              <a:t>získání měsíčních statistik</a:t>
+              <a:t>Use case a scénáře</a:t>
             </a:r>
           </a:p>
         </p:txBody>
       </p:sp>
       <p:pic>
         <p:nvPicPr>
-          <p:cNvPr id="4" name="Zástupný obsah 3">
-            <a:extLst>
-              <a:ext uri="{FF2B5EF4-FFF2-40B4-BE49-F238E27FC236}">
-                <a16:creationId xmlns:a16="http://schemas.microsoft.com/office/drawing/2014/main" id="{5C637A2E-98F1-40C9-9244-56DA9A621B06}"/>
+          <p:cNvPr id="6" name="Zástupný obsah 5" descr="Obsah obrázku snímek obrazovky&#10;&#10;Popis byl vytvořen automaticky">
+            <a:extLst>
+              <a:ext uri="{FF2B5EF4-FFF2-40B4-BE49-F238E27FC236}">
+                <a16:creationId xmlns:a16="http://schemas.microsoft.com/office/drawing/2014/main" id="{837C30E1-17ED-416C-A363-50FB4DF65FEC}"/>
               </a:ext>
             </a:extLst>
           </p:cNvPr>
@@ -3947,25 +4023,28 @@
           </p:nvPr>
         </p:nvPicPr>
         <p:blipFill>
-          <a:blip r:embed="rId2"/>
+          <a:blip r:embed="rId2">
+            <a:extLst>
+              <a:ext uri="{28A0092B-C50C-407E-A947-70E740481C1C}">
+                <a14:useLocalDpi xmlns:a14="http://schemas.microsoft.com/office/drawing/2010/main" val="0"/>
+              </a:ext>
+            </a:extLst>
+          </a:blip>
           <a:stretch>
             <a:fillRect/>
           </a:stretch>
         </p:blipFill>
         <p:spPr>
           <a:xfrm>
-            <a:off x="2342333" y="1975155"/>
-            <a:ext cx="7507333" cy="4105134"/>
+            <a:off x="113676" y="1810054"/>
+            <a:ext cx="11964648" cy="4682821"/>
           </a:xfrm>
-          <a:prstGeom prst="rect">
-            <a:avLst/>
-          </a:prstGeom>
         </p:spPr>
       </p:pic>
     </p:spTree>
     <p:extLst>
       <p:ext uri="{BB962C8B-B14F-4D97-AF65-F5344CB8AC3E}">
-        <p14:creationId xmlns:p14="http://schemas.microsoft.com/office/powerpoint/2010/main" val="3071574708"/>
+        <p14:creationId xmlns:p14="http://schemas.microsoft.com/office/powerpoint/2010/main" val="2038734746"/>
       </p:ext>
     </p:extLst>
   </p:cSld>
@@ -3997,7 +4076,7 @@
           <p:cNvPr id="2" name="Nadpis 1">
             <a:extLst>
               <a:ext uri="{FF2B5EF4-FFF2-40B4-BE49-F238E27FC236}">
-                <a16:creationId xmlns:a16="http://schemas.microsoft.com/office/drawing/2014/main" id="{E3F00472-D8D1-43C9-9343-39F620C0C07C}"/>
+                <a16:creationId xmlns:a16="http://schemas.microsoft.com/office/drawing/2014/main" id="{08668BC7-17A4-4560-A3C4-103A87E14B29}"/>
               </a:ext>
             </a:extLst>
           </p:cNvPr>
@@ -4016,7 +4095,7 @@
             <a:pPr algn="ctr"/>
             <a:r>
               <a:rPr lang="cs-CZ" dirty="0"/>
-              <a:t>Sekvenční návrhový diagram</a:t>
+              <a:t>Sekvenční analytický diagram</a:t>
             </a:r>
             <a:br>
               <a:rPr lang="cs-CZ" dirty="0"/>
@@ -4030,10 +4109,10 @@
       </p:sp>
       <p:pic>
         <p:nvPicPr>
-          <p:cNvPr id="11" name="Zástupný obsah 10" descr="Obsah obrázku snímek obrazovky&#10;&#10;Popis byl vytvořen automaticky">
-            <a:extLst>
-              <a:ext uri="{FF2B5EF4-FFF2-40B4-BE49-F238E27FC236}">
-                <a16:creationId xmlns:a16="http://schemas.microsoft.com/office/drawing/2014/main" id="{E1401B12-B65F-4690-BF68-CF7584BC069A}"/>
+          <p:cNvPr id="4" name="Zástupný obsah 3">
+            <a:extLst>
+              <a:ext uri="{FF2B5EF4-FFF2-40B4-BE49-F238E27FC236}">
+                <a16:creationId xmlns:a16="http://schemas.microsoft.com/office/drawing/2014/main" id="{5C637A2E-98F1-40C9-9244-56DA9A621B06}"/>
               </a:ext>
             </a:extLst>
           </p:cNvPr>
@@ -4045,28 +4124,25 @@
           </p:nvPr>
         </p:nvPicPr>
         <p:blipFill>
-          <a:blip r:embed="rId2">
-            <a:extLst>
-              <a:ext uri="{28A0092B-C50C-407E-A947-70E740481C1C}">
-                <a14:useLocalDpi xmlns:a14="http://schemas.microsoft.com/office/drawing/2010/main" val="0"/>
-              </a:ext>
-            </a:extLst>
-          </a:blip>
+          <a:blip r:embed="rId2"/>
           <a:stretch>
             <a:fillRect/>
           </a:stretch>
         </p:blipFill>
         <p:spPr>
           <a:xfrm>
-            <a:off x="3003836" y="1690688"/>
-            <a:ext cx="6422343" cy="4802187"/>
+            <a:off x="2851068" y="1994008"/>
+            <a:ext cx="6489864" cy="3548765"/>
           </a:xfrm>
+          <a:prstGeom prst="rect">
+            <a:avLst/>
+          </a:prstGeom>
         </p:spPr>
       </p:pic>
     </p:spTree>
     <p:extLst>
       <p:ext uri="{BB962C8B-B14F-4D97-AF65-F5344CB8AC3E}">
-        <p14:creationId xmlns:p14="http://schemas.microsoft.com/office/powerpoint/2010/main" val="736648243"/>
+        <p14:creationId xmlns:p14="http://schemas.microsoft.com/office/powerpoint/2010/main" val="3071574708"/>
       </p:ext>
     </p:extLst>
   </p:cSld>
@@ -4098,7 +4174,7 @@
           <p:cNvPr id="2" name="Nadpis 1">
             <a:extLst>
               <a:ext uri="{FF2B5EF4-FFF2-40B4-BE49-F238E27FC236}">
-                <a16:creationId xmlns:a16="http://schemas.microsoft.com/office/drawing/2014/main" id="{55882398-8B22-4A17-9AA8-B27307A85F78}"/>
+                <a16:creationId xmlns:a16="http://schemas.microsoft.com/office/drawing/2014/main" id="{E3F00472-D8D1-43C9-9343-39F620C0C07C}"/>
               </a:ext>
             </a:extLst>
           </p:cNvPr>
@@ -4117,17 +4193,111 @@
             <a:pPr algn="ctr"/>
             <a:r>
               <a:rPr lang="cs-CZ" dirty="0"/>
-              <a:t>Diagram tříd</a:t>
+              <a:t>Sekvenční návrhový diagram</a:t>
+            </a:r>
+            <a:br>
+              <a:rPr lang="cs-CZ" dirty="0"/>
+            </a:br>
+            <a:r>
+              <a:rPr lang="cs-CZ" dirty="0"/>
+              <a:t>získání měsíčních statistik</a:t>
             </a:r>
           </a:p>
         </p:txBody>
       </p:sp>
       <p:pic>
         <p:nvPicPr>
-          <p:cNvPr id="5" name="Zástupný obsah 4" descr="Obsah obrázku text&#10;&#10;Popis byl vytvořen automaticky">
-            <a:extLst>
-              <a:ext uri="{FF2B5EF4-FFF2-40B4-BE49-F238E27FC236}">
-                <a16:creationId xmlns:a16="http://schemas.microsoft.com/office/drawing/2014/main" id="{0834F0A7-A18A-4DA2-BAB9-7A2069A5912A}"/>
+          <p:cNvPr id="4" name="Zástupný obsah 3">
+            <a:extLst>
+              <a:ext uri="{FF2B5EF4-FFF2-40B4-BE49-F238E27FC236}">
+                <a16:creationId xmlns:a16="http://schemas.microsoft.com/office/drawing/2014/main" id="{8AEF4095-C806-4914-A738-DF9B86A87545}"/>
+              </a:ext>
+            </a:extLst>
+          </p:cNvPr>
+          <p:cNvPicPr>
+            <a:picLocks noGrp="1" noChangeAspect="1"/>
+          </p:cNvPicPr>
+          <p:nvPr>
+            <p:ph idx="1"/>
+          </p:nvPr>
+        </p:nvPicPr>
+        <p:blipFill>
+          <a:blip r:embed="rId2"/>
+          <a:stretch>
+            <a:fillRect/>
+          </a:stretch>
+        </p:blipFill>
+        <p:spPr>
+          <a:xfrm>
+            <a:off x="931709" y="1690688"/>
+            <a:ext cx="10328581" cy="4333376"/>
+          </a:xfrm>
+          <a:prstGeom prst="rect">
+            <a:avLst/>
+          </a:prstGeom>
+        </p:spPr>
+      </p:pic>
+    </p:spTree>
+    <p:extLst>
+      <p:ext uri="{BB962C8B-B14F-4D97-AF65-F5344CB8AC3E}">
+        <p14:creationId xmlns:p14="http://schemas.microsoft.com/office/powerpoint/2010/main" val="736648243"/>
+      </p:ext>
+    </p:extLst>
+  </p:cSld>
+  <p:clrMapOvr>
+    <a:masterClrMapping/>
+  </p:clrMapOvr>
+</p:sld>
+</file>
+
+<file path=ppt/slides/slide9.xml><?xml version="1.0" encoding="utf-8"?>
+<p:sld xmlns:a="http://schemas.openxmlformats.org/drawingml/2006/main" xmlns:r="http://schemas.openxmlformats.org/officeDocument/2006/relationships" xmlns:p="http://schemas.openxmlformats.org/presentationml/2006/main">
+  <p:cSld>
+    <p:spTree>
+      <p:nvGrpSpPr>
+        <p:cNvPr id="1" name=""/>
+        <p:cNvGrpSpPr/>
+        <p:nvPr/>
+      </p:nvGrpSpPr>
+      <p:grpSpPr>
+        <a:xfrm>
+          <a:off x="0" y="0"/>
+          <a:ext cx="0" cy="0"/>
+          <a:chOff x="0" y="0"/>
+          <a:chExt cx="0" cy="0"/>
+        </a:xfrm>
+      </p:grpSpPr>
+      <p:sp>
+        <p:nvSpPr>
+          <p:cNvPr id="2" name="Nadpis 1">
+            <a:extLst>
+              <a:ext uri="{FF2B5EF4-FFF2-40B4-BE49-F238E27FC236}">
+                <a16:creationId xmlns:a16="http://schemas.microsoft.com/office/drawing/2014/main" id="{134B5B64-9916-47D4-9194-66CD52F5C03F}"/>
+              </a:ext>
+            </a:extLst>
+          </p:cNvPr>
+          <p:cNvSpPr>
+            <a:spLocks noGrp="1"/>
+          </p:cNvSpPr>
+          <p:nvPr>
+            <p:ph type="title"/>
+          </p:nvPr>
+        </p:nvSpPr>
+        <p:spPr/>
+        <p:txBody>
+          <a:bodyPr/>
+          <a:lstStyle/>
+          <a:p>
+            <a:endParaRPr lang="cs-CZ"/>
+          </a:p>
+        </p:txBody>
+      </p:sp>
+      <p:pic>
+        <p:nvPicPr>
+          <p:cNvPr id="9" name="Zástupný obsah 8">
+            <a:extLst>
+              <a:ext uri="{FF2B5EF4-FFF2-40B4-BE49-F238E27FC236}">
+                <a16:creationId xmlns:a16="http://schemas.microsoft.com/office/drawing/2014/main" id="{E360181C-A3BC-43E3-80F1-4CB485271131}"/>
               </a:ext>
             </a:extLst>
           </p:cNvPr>
@@ -4152,15 +4322,15 @@
         </p:blipFill>
         <p:spPr>
           <a:xfrm>
-            <a:off x="131975" y="1351102"/>
-            <a:ext cx="11858920" cy="5398490"/>
+            <a:off x="3235673" y="2123835"/>
+            <a:ext cx="5720653" cy="3843332"/>
           </a:xfrm>
         </p:spPr>
       </p:pic>
     </p:spTree>
     <p:extLst>
       <p:ext uri="{BB962C8B-B14F-4D97-AF65-F5344CB8AC3E}">
-        <p14:creationId xmlns:p14="http://schemas.microsoft.com/office/powerpoint/2010/main" val="4208394178"/>
+        <p14:creationId xmlns:p14="http://schemas.microsoft.com/office/powerpoint/2010/main" val="1821979586"/>
       </p:ext>
     </p:extLst>
   </p:cSld>

</xml_diff>